<commit_message>
add uml design overview
</commit_message>
<xml_diff>
--- a/Workflow/Skin Cancer Classification Application Development Workflow.pptx
+++ b/Workflow/Skin Cancer Classification Application Development Workflow.pptx
@@ -6,6 +6,7 @@
   </p:sldMasterIdLst>
   <p:sldIdLst>
     <p:sldId id="257" r:id="rId2"/>
+    <p:sldId id="258" r:id="rId3"/>
   </p:sldIdLst>
   <p:sldSz cx="12192000" cy="6858000"/>
   <p:notesSz cx="6858000" cy="9144000"/>
@@ -104,6 +105,11 @@
       </a:defRPr>
     </a:lvl9pPr>
   </p:defaultTextStyle>
+  <p:extLst>
+    <p:ext uri="{EFAFB233-063F-42B5-8137-9DF3F51BA10A}">
+      <p15:sldGuideLst xmlns:p15="http://schemas.microsoft.com/office/powerpoint/2012/main"/>
+    </p:ext>
+  </p:extLst>
 </p:presentation>
 </file>
 
@@ -658,7 +664,7 @@
           <a:p>
             <a:fld id="{F08F7BF1-B82F-4B46-981D-59E0FBA11DA1}" type="datetimeFigureOut">
               <a:rPr lang="zh-CN" altLang="en-US" smtClean="0"/>
-              <a:t>2024/11/10</a:t>
+              <a:t>2025/1/12</a:t>
             </a:fld>
             <a:endParaRPr lang="zh-CN" altLang="en-US"/>
           </a:p>
@@ -856,7 +862,7 @@
           <a:p>
             <a:fld id="{F08F7BF1-B82F-4B46-981D-59E0FBA11DA1}" type="datetimeFigureOut">
               <a:rPr lang="zh-CN" altLang="en-US" smtClean="0"/>
-              <a:t>2024/11/10</a:t>
+              <a:t>2025/1/12</a:t>
             </a:fld>
             <a:endParaRPr lang="zh-CN" altLang="en-US"/>
           </a:p>
@@ -1064,7 +1070,7 @@
           <a:p>
             <a:fld id="{F08F7BF1-B82F-4B46-981D-59E0FBA11DA1}" type="datetimeFigureOut">
               <a:rPr lang="zh-CN" altLang="en-US" smtClean="0"/>
-              <a:t>2024/11/10</a:t>
+              <a:t>2025/1/12</a:t>
             </a:fld>
             <a:endParaRPr lang="zh-CN" altLang="en-US"/>
           </a:p>
@@ -1262,7 +1268,7 @@
           <a:p>
             <a:fld id="{F08F7BF1-B82F-4B46-981D-59E0FBA11DA1}" type="datetimeFigureOut">
               <a:rPr lang="zh-CN" altLang="en-US" smtClean="0"/>
-              <a:t>2024/11/10</a:t>
+              <a:t>2025/1/12</a:t>
             </a:fld>
             <a:endParaRPr lang="zh-CN" altLang="en-US"/>
           </a:p>
@@ -1537,7 +1543,7 @@
           <a:p>
             <a:fld id="{F08F7BF1-B82F-4B46-981D-59E0FBA11DA1}" type="datetimeFigureOut">
               <a:rPr lang="zh-CN" altLang="en-US" smtClean="0"/>
-              <a:t>2024/11/10</a:t>
+              <a:t>2025/1/12</a:t>
             </a:fld>
             <a:endParaRPr lang="zh-CN" altLang="en-US"/>
           </a:p>
@@ -1802,7 +1808,7 @@
           <a:p>
             <a:fld id="{F08F7BF1-B82F-4B46-981D-59E0FBA11DA1}" type="datetimeFigureOut">
               <a:rPr lang="zh-CN" altLang="en-US" smtClean="0"/>
-              <a:t>2024/11/10</a:t>
+              <a:t>2025/1/12</a:t>
             </a:fld>
             <a:endParaRPr lang="zh-CN" altLang="en-US"/>
           </a:p>
@@ -2214,7 +2220,7 @@
           <a:p>
             <a:fld id="{F08F7BF1-B82F-4B46-981D-59E0FBA11DA1}" type="datetimeFigureOut">
               <a:rPr lang="zh-CN" altLang="en-US" smtClean="0"/>
-              <a:t>2024/11/10</a:t>
+              <a:t>2025/1/12</a:t>
             </a:fld>
             <a:endParaRPr lang="zh-CN" altLang="en-US"/>
           </a:p>
@@ -2355,7 +2361,7 @@
           <a:p>
             <a:fld id="{F08F7BF1-B82F-4B46-981D-59E0FBA11DA1}" type="datetimeFigureOut">
               <a:rPr lang="zh-CN" altLang="en-US" smtClean="0"/>
-              <a:t>2024/11/10</a:t>
+              <a:t>2025/1/12</a:t>
             </a:fld>
             <a:endParaRPr lang="zh-CN" altLang="en-US"/>
           </a:p>
@@ -2468,7 +2474,7 @@
           <a:p>
             <a:fld id="{F08F7BF1-B82F-4B46-981D-59E0FBA11DA1}" type="datetimeFigureOut">
               <a:rPr lang="zh-CN" altLang="en-US" smtClean="0"/>
-              <a:t>2024/11/10</a:t>
+              <a:t>2025/1/12</a:t>
             </a:fld>
             <a:endParaRPr lang="zh-CN" altLang="en-US"/>
           </a:p>
@@ -2779,7 +2785,7 @@
           <a:p>
             <a:fld id="{F08F7BF1-B82F-4B46-981D-59E0FBA11DA1}" type="datetimeFigureOut">
               <a:rPr lang="zh-CN" altLang="en-US" smtClean="0"/>
-              <a:t>2024/11/10</a:t>
+              <a:t>2025/1/12</a:t>
             </a:fld>
             <a:endParaRPr lang="zh-CN" altLang="en-US"/>
           </a:p>
@@ -3067,7 +3073,7 @@
           <a:p>
             <a:fld id="{F08F7BF1-B82F-4B46-981D-59E0FBA11DA1}" type="datetimeFigureOut">
               <a:rPr lang="zh-CN" altLang="en-US" smtClean="0"/>
-              <a:t>2024/11/10</a:t>
+              <a:t>2025/1/12</a:t>
             </a:fld>
             <a:endParaRPr lang="zh-CN" altLang="en-US"/>
           </a:p>
@@ -3308,7 +3314,7 @@
           <a:p>
             <a:fld id="{F08F7BF1-B82F-4B46-981D-59E0FBA11DA1}" type="datetimeFigureOut">
               <a:rPr lang="zh-CN" altLang="en-US" smtClean="0"/>
-              <a:t>2024/11/10</a:t>
+              <a:t>2025/1/12</a:t>
             </a:fld>
             <a:endParaRPr lang="zh-CN" altLang="en-US"/>
           </a:p>
@@ -5107,6 +5113,1353 @@
     <p:extLst>
       <p:ext uri="{BB962C8B-B14F-4D97-AF65-F5344CB8AC3E}">
         <p14:creationId xmlns:p14="http://schemas.microsoft.com/office/powerpoint/2010/main" val="2938629371"/>
+      </p:ext>
+    </p:extLst>
+  </p:cSld>
+  <p:clrMapOvr>
+    <a:masterClrMapping/>
+  </p:clrMapOvr>
+</p:sld>
+</file>
+
+<file path=ppt/slides/slide2.xml><?xml version="1.0" encoding="utf-8"?>
+<p:sld xmlns:a="http://schemas.openxmlformats.org/drawingml/2006/main" xmlns:r="http://schemas.openxmlformats.org/officeDocument/2006/relationships" xmlns:p="http://schemas.openxmlformats.org/presentationml/2006/main">
+  <p:cSld>
+    <p:spTree>
+      <p:nvGrpSpPr>
+        <p:cNvPr id="1" name=""/>
+        <p:cNvGrpSpPr/>
+        <p:nvPr/>
+      </p:nvGrpSpPr>
+      <p:grpSpPr>
+        <a:xfrm>
+          <a:off x="0" y="0"/>
+          <a:ext cx="0" cy="0"/>
+          <a:chOff x="0" y="0"/>
+          <a:chExt cx="0" cy="0"/>
+        </a:xfrm>
+      </p:grpSpPr>
+      <p:sp>
+        <p:nvSpPr>
+          <p:cNvPr id="4" name="Rectangle 1">
+            <a:extLst>
+              <a:ext uri="{FF2B5EF4-FFF2-40B4-BE49-F238E27FC236}">
+                <a16:creationId xmlns:a16="http://schemas.microsoft.com/office/drawing/2014/main" id="{4DD020A1-3CAD-6943-89CD-A1EBDA7C0C7E}"/>
+              </a:ext>
+            </a:extLst>
+          </p:cNvPr>
+          <p:cNvSpPr>
+            <a:spLocks noChangeArrowheads="1"/>
+          </p:cNvSpPr>
+          <p:nvPr/>
+        </p:nvSpPr>
+        <p:spPr bwMode="auto">
+          <a:xfrm>
+            <a:off x="470938" y="203271"/>
+            <a:ext cx="7507376" cy="954107"/>
+          </a:xfrm>
+          <a:prstGeom prst="rect">
+            <a:avLst/>
+          </a:prstGeom>
+          <a:noFill/>
+          <a:ln>
+            <a:noFill/>
+          </a:ln>
+          <a:effectLst/>
+          <a:extLst>
+            <a:ext uri="{909E8E84-426E-40DD-AFC4-6F175D3DCCD1}">
+              <a14:hiddenFill xmlns:a14="http://schemas.microsoft.com/office/drawing/2010/main">
+                <a:solidFill>
+                  <a:schemeClr val="accent1"/>
+                </a:solidFill>
+              </a14:hiddenFill>
+            </a:ext>
+            <a:ext uri="{91240B29-F687-4F45-9708-019B960494DF}">
+              <a14:hiddenLine xmlns:a14="http://schemas.microsoft.com/office/drawing/2010/main" w="9525">
+                <a:solidFill>
+                  <a:schemeClr val="tx1"/>
+                </a:solidFill>
+                <a:miter lim="800000"/>
+                <a:headEnd/>
+                <a:tailEnd/>
+              </a14:hiddenLine>
+            </a:ext>
+            <a:ext uri="{AF507438-7753-43E0-B8FC-AC1667EBCBE1}">
+              <a14:hiddenEffects xmlns:a14="http://schemas.microsoft.com/office/drawing/2010/main">
+                <a:effectLst>
+                  <a:outerShdw dist="35921" dir="2700000" algn="ctr" rotWithShape="0">
+                    <a:schemeClr val="bg2"/>
+                  </a:outerShdw>
+                </a:effectLst>
+              </a14:hiddenEffects>
+            </a:ext>
+          </a:extLst>
+        </p:spPr>
+        <p:txBody>
+          <a:bodyPr vert="horz" wrap="square" lIns="91440" tIns="45720" rIns="91440" bIns="45720" numCol="1" anchor="ctr" anchorCtr="0" compatLnSpc="1">
+            <a:prstTxWarp prst="textNoShape">
+              <a:avLst/>
+            </a:prstTxWarp>
+            <a:spAutoFit/>
+          </a:bodyPr>
+          <a:lstStyle/>
+          <a:p>
+            <a:pPr marL="0" marR="0" lvl="0" indent="0" algn="l" defTabSz="914400" rtl="0" eaLnBrk="0" fontAlgn="base" latinLnBrk="0" hangingPunct="0">
+              <a:lnSpc>
+                <a:spcPct val="100000"/>
+              </a:lnSpc>
+              <a:spcBef>
+                <a:spcPct val="0"/>
+              </a:spcBef>
+              <a:spcAft>
+                <a:spcPct val="0"/>
+              </a:spcAft>
+              <a:buClrTx/>
+              <a:buSzTx/>
+              <a:buFontTx/>
+              <a:buNone/>
+              <a:tabLst/>
+            </a:pPr>
+            <a:r>
+              <a:rPr kumimoji="0" lang="zh-CN" altLang="zh-CN" sz="2800" b="1" i="0" u="none" strike="noStrike" cap="none" normalizeH="0" baseline="0" dirty="0">
+                <a:ln>
+                  <a:noFill/>
+                </a:ln>
+                <a:solidFill>
+                  <a:srgbClr val="333333"/>
+                </a:solidFill>
+                <a:effectLst/>
+                <a:latin typeface="Open Sans" panose="020B0606030504020204" pitchFamily="34" charset="0"/>
+                <a:cs typeface="Open Sans" panose="020B0606030504020204" pitchFamily="34" charset="0"/>
+              </a:rPr>
+              <a:t>Main Classes and Responsibilities</a:t>
+            </a:r>
+          </a:p>
+          <a:p>
+            <a:pPr marL="0" marR="0" lvl="0" indent="0" algn="l" defTabSz="914400" rtl="0" eaLnBrk="0" fontAlgn="base" latinLnBrk="0" hangingPunct="0">
+              <a:lnSpc>
+                <a:spcPct val="100000"/>
+              </a:lnSpc>
+              <a:spcBef>
+                <a:spcPct val="0"/>
+              </a:spcBef>
+              <a:spcAft>
+                <a:spcPct val="0"/>
+              </a:spcAft>
+              <a:buClrTx/>
+              <a:buSzTx/>
+              <a:buFontTx/>
+              <a:buNone/>
+              <a:tabLst/>
+            </a:pPr>
+            <a:endParaRPr kumimoji="0" lang="zh-CN" altLang="zh-CN" sz="2800" b="0" i="0" u="none" strike="noStrike" cap="none" normalizeH="0" baseline="0" dirty="0">
+              <a:ln>
+                <a:noFill/>
+              </a:ln>
+              <a:solidFill>
+                <a:schemeClr val="tx1"/>
+              </a:solidFill>
+              <a:effectLst/>
+              <a:latin typeface="Arial" panose="020B0604020202020204" pitchFamily="34" charset="0"/>
+            </a:endParaRPr>
+          </a:p>
+        </p:txBody>
+      </p:sp>
+      <p:sp>
+        <p:nvSpPr>
+          <p:cNvPr id="5" name="矩形: 圆角 4">
+            <a:extLst>
+              <a:ext uri="{FF2B5EF4-FFF2-40B4-BE49-F238E27FC236}">
+                <a16:creationId xmlns:a16="http://schemas.microsoft.com/office/drawing/2014/main" id="{2B255584-158A-8E33-0BDE-04766DF3C613}"/>
+              </a:ext>
+            </a:extLst>
+          </p:cNvPr>
+          <p:cNvSpPr/>
+          <p:nvPr/>
+        </p:nvSpPr>
+        <p:spPr>
+          <a:xfrm>
+            <a:off x="552331" y="1024824"/>
+            <a:ext cx="1352550" cy="488950"/>
+          </a:xfrm>
+          <a:prstGeom prst="roundRect">
+            <a:avLst/>
+          </a:prstGeom>
+        </p:spPr>
+        <p:style>
+          <a:lnRef idx="2">
+            <a:schemeClr val="accent1">
+              <a:shade val="15000"/>
+            </a:schemeClr>
+          </a:lnRef>
+          <a:fillRef idx="1">
+            <a:schemeClr val="accent1"/>
+          </a:fillRef>
+          <a:effectRef idx="0">
+            <a:schemeClr val="accent1"/>
+          </a:effectRef>
+          <a:fontRef idx="minor">
+            <a:schemeClr val="lt1"/>
+          </a:fontRef>
+        </p:style>
+        <p:txBody>
+          <a:bodyPr rtlCol="0" anchor="ctr"/>
+          <a:lstStyle/>
+          <a:p>
+            <a:pPr algn="ctr"/>
+            <a:r>
+              <a:rPr lang="en-US" altLang="zh-CN" sz="1200" dirty="0" err="1"/>
+              <a:t>ProjectConfig</a:t>
+            </a:r>
+            <a:endParaRPr lang="zh-CN" altLang="en-US" sz="1200" dirty="0"/>
+          </a:p>
+        </p:txBody>
+      </p:sp>
+      <p:sp>
+        <p:nvSpPr>
+          <p:cNvPr id="6" name="矩形 37">
+            <a:extLst>
+              <a:ext uri="{FF2B5EF4-FFF2-40B4-BE49-F238E27FC236}">
+                <a16:creationId xmlns:a16="http://schemas.microsoft.com/office/drawing/2014/main" id="{233E4E2F-8FD6-7ADD-E999-3AB455788C7F}"/>
+              </a:ext>
+            </a:extLst>
+          </p:cNvPr>
+          <p:cNvSpPr/>
+          <p:nvPr/>
+        </p:nvSpPr>
+        <p:spPr>
+          <a:xfrm>
+            <a:off x="552331" y="1625695"/>
+            <a:ext cx="1352550" cy="1297467"/>
+          </a:xfrm>
+          <a:prstGeom prst="rect">
+            <a:avLst/>
+          </a:prstGeom>
+        </p:spPr>
+        <p:style>
+          <a:lnRef idx="1">
+            <a:schemeClr val="accent1"/>
+          </a:lnRef>
+          <a:fillRef idx="2">
+            <a:schemeClr val="accent1"/>
+          </a:fillRef>
+          <a:effectRef idx="1">
+            <a:schemeClr val="accent1"/>
+          </a:effectRef>
+          <a:fontRef idx="minor">
+            <a:schemeClr val="dk1"/>
+          </a:fontRef>
+        </p:style>
+        <p:txBody>
+          <a:bodyPr rtlCol="0" anchor="ctr"/>
+          <a:lstStyle/>
+          <a:p>
+            <a:pPr marL="171450" indent="-171450">
+              <a:buFont typeface="Arial" panose="020B0604020202020204" pitchFamily="34" charset="0"/>
+              <a:buChar char="•"/>
+            </a:pPr>
+            <a:r>
+              <a:rPr lang="en-US" altLang="zh-CN" sz="1000" b="1" dirty="0"/>
+              <a:t>Attributes</a:t>
+            </a:r>
+            <a:r>
+              <a:rPr lang="en-US" altLang="zh-CN" sz="1000" dirty="0"/>
+              <a:t>: `</a:t>
+            </a:r>
+            <a:r>
+              <a:rPr lang="en-US" altLang="zh-CN" sz="1000" dirty="0" err="1"/>
+              <a:t>database_path</a:t>
+            </a:r>
+            <a:r>
+              <a:rPr lang="en-US" altLang="zh-CN" sz="1000" dirty="0"/>
+              <a:t>`, `</a:t>
+            </a:r>
+            <a:r>
+              <a:rPr lang="en-US" altLang="zh-CN" sz="1000" dirty="0" err="1"/>
+              <a:t>model_path</a:t>
+            </a:r>
+            <a:r>
+              <a:rPr lang="en-US" altLang="zh-CN" sz="1000" dirty="0"/>
+              <a:t>`, `</a:t>
+            </a:r>
+            <a:r>
+              <a:rPr lang="en-US" altLang="zh-CN" sz="1000" dirty="0" err="1"/>
+              <a:t>upload_path</a:t>
+            </a:r>
+            <a:r>
+              <a:rPr lang="en-US" altLang="zh-CN" sz="1000" dirty="0"/>
+              <a:t>`</a:t>
+            </a:r>
+          </a:p>
+          <a:p>
+            <a:pPr marL="171450" indent="-171450">
+              <a:buFont typeface="Arial" panose="020B0604020202020204" pitchFamily="34" charset="0"/>
+              <a:buChar char="•"/>
+            </a:pPr>
+            <a:r>
+              <a:rPr lang="en-US" altLang="zh-CN" sz="1000" b="1" dirty="0"/>
+              <a:t>Methods</a:t>
+            </a:r>
+            <a:r>
+              <a:rPr lang="en-US" altLang="zh-CN" sz="1000" dirty="0"/>
+              <a:t>: `</a:t>
+            </a:r>
+            <a:r>
+              <a:rPr lang="en-US" altLang="zh-CN" sz="1000" dirty="0" err="1"/>
+              <a:t>load_config</a:t>
+            </a:r>
+            <a:r>
+              <a:rPr lang="en-US" altLang="zh-CN" sz="1000" dirty="0"/>
+              <a:t>()`, `</a:t>
+            </a:r>
+            <a:r>
+              <a:rPr lang="en-US" altLang="zh-CN" sz="1000" dirty="0" err="1"/>
+              <a:t>save_config</a:t>
+            </a:r>
+            <a:r>
+              <a:rPr lang="en-US" altLang="zh-CN" sz="1000" dirty="0"/>
+              <a:t>()`</a:t>
+            </a:r>
+            <a:endParaRPr lang="zh-CN" altLang="en-US" sz="1000" dirty="0"/>
+          </a:p>
+        </p:txBody>
+      </p:sp>
+      <p:sp>
+        <p:nvSpPr>
+          <p:cNvPr id="7" name="矩形: 圆角 4">
+            <a:extLst>
+              <a:ext uri="{FF2B5EF4-FFF2-40B4-BE49-F238E27FC236}">
+                <a16:creationId xmlns:a16="http://schemas.microsoft.com/office/drawing/2014/main" id="{3D9F7043-1934-1ACF-F43E-73B7D4DBFFED}"/>
+              </a:ext>
+            </a:extLst>
+          </p:cNvPr>
+          <p:cNvSpPr/>
+          <p:nvPr/>
+        </p:nvSpPr>
+        <p:spPr>
+          <a:xfrm>
+            <a:off x="2422908" y="1024824"/>
+            <a:ext cx="1509654" cy="488950"/>
+          </a:xfrm>
+          <a:prstGeom prst="roundRect">
+            <a:avLst/>
+          </a:prstGeom>
+        </p:spPr>
+        <p:style>
+          <a:lnRef idx="2">
+            <a:schemeClr val="accent1">
+              <a:shade val="15000"/>
+            </a:schemeClr>
+          </a:lnRef>
+          <a:fillRef idx="1">
+            <a:schemeClr val="accent1"/>
+          </a:fillRef>
+          <a:effectRef idx="0">
+            <a:schemeClr val="accent1"/>
+          </a:effectRef>
+          <a:fontRef idx="minor">
+            <a:schemeClr val="lt1"/>
+          </a:fontRef>
+        </p:style>
+        <p:txBody>
+          <a:bodyPr rtlCol="0" anchor="ctr"/>
+          <a:lstStyle/>
+          <a:p>
+            <a:pPr algn="ctr"/>
+            <a:r>
+              <a:rPr lang="en-US" altLang="zh-CN" sz="1200" dirty="0" err="1"/>
+              <a:t>DatabaseManager</a:t>
+            </a:r>
+            <a:endParaRPr lang="zh-CN" altLang="en-US" sz="1200" dirty="0"/>
+          </a:p>
+        </p:txBody>
+      </p:sp>
+      <p:sp>
+        <p:nvSpPr>
+          <p:cNvPr id="8" name="矩形 37">
+            <a:extLst>
+              <a:ext uri="{FF2B5EF4-FFF2-40B4-BE49-F238E27FC236}">
+                <a16:creationId xmlns:a16="http://schemas.microsoft.com/office/drawing/2014/main" id="{7A2B73EB-7F67-DE61-0566-1DD9622F919F}"/>
+              </a:ext>
+            </a:extLst>
+          </p:cNvPr>
+          <p:cNvSpPr/>
+          <p:nvPr/>
+        </p:nvSpPr>
+        <p:spPr>
+          <a:xfrm>
+            <a:off x="2422908" y="1625695"/>
+            <a:ext cx="1509654" cy="1297467"/>
+          </a:xfrm>
+          <a:prstGeom prst="rect">
+            <a:avLst/>
+          </a:prstGeom>
+        </p:spPr>
+        <p:style>
+          <a:lnRef idx="1">
+            <a:schemeClr val="accent1"/>
+          </a:lnRef>
+          <a:fillRef idx="2">
+            <a:schemeClr val="accent1"/>
+          </a:fillRef>
+          <a:effectRef idx="1">
+            <a:schemeClr val="accent1"/>
+          </a:effectRef>
+          <a:fontRef idx="minor">
+            <a:schemeClr val="dk1"/>
+          </a:fontRef>
+        </p:style>
+        <p:txBody>
+          <a:bodyPr rtlCol="0" anchor="ctr"/>
+          <a:lstStyle/>
+          <a:p>
+            <a:pPr marL="171450" indent="-171450">
+              <a:buFont typeface="Arial" panose="020B0604020202020204" pitchFamily="34" charset="0"/>
+              <a:buChar char="•"/>
+            </a:pPr>
+            <a:r>
+              <a:rPr lang="en-US" altLang="zh-CN" sz="1000" b="1" dirty="0"/>
+              <a:t>Attributes</a:t>
+            </a:r>
+            <a:r>
+              <a:rPr lang="en-US" altLang="zh-CN" sz="1000" dirty="0"/>
+              <a:t>: `connection` </a:t>
+            </a:r>
+            <a:r>
+              <a:rPr lang="en-US" altLang="zh-CN" sz="1000" b="1" dirty="0"/>
+              <a:t>Methods</a:t>
+            </a:r>
+            <a:r>
+              <a:rPr lang="en-US" altLang="zh-CN" sz="1000" dirty="0"/>
+              <a:t>:</a:t>
+            </a:r>
+          </a:p>
+          <a:p>
+            <a:pPr marL="171450" indent="-171450">
+              <a:buFont typeface="Arial" panose="020B0604020202020204" pitchFamily="34" charset="0"/>
+              <a:buChar char="•"/>
+            </a:pPr>
+            <a:r>
+              <a:rPr lang="en-US" altLang="zh-CN" sz="1000" dirty="0"/>
+              <a:t> `connect()`, `</a:t>
+            </a:r>
+            <a:r>
+              <a:rPr lang="en-US" altLang="zh-CN" sz="1000" dirty="0" err="1"/>
+              <a:t>execute_query</a:t>
+            </a:r>
+            <a:r>
+              <a:rPr lang="en-US" altLang="zh-CN" sz="1000" dirty="0"/>
+              <a:t>()`, `</a:t>
+            </a:r>
+            <a:r>
+              <a:rPr lang="en-US" altLang="zh-CN" sz="1000" dirty="0" err="1"/>
+              <a:t>close_connection</a:t>
+            </a:r>
+            <a:r>
+              <a:rPr lang="en-US" altLang="zh-CN" sz="1000" dirty="0"/>
+              <a:t>()`</a:t>
+            </a:r>
+            <a:endParaRPr lang="zh-CN" altLang="en-US" sz="1000" dirty="0"/>
+          </a:p>
+        </p:txBody>
+      </p:sp>
+      <p:sp>
+        <p:nvSpPr>
+          <p:cNvPr id="9" name="矩形: 圆角 4">
+            <a:extLst>
+              <a:ext uri="{FF2B5EF4-FFF2-40B4-BE49-F238E27FC236}">
+                <a16:creationId xmlns:a16="http://schemas.microsoft.com/office/drawing/2014/main" id="{3C2125B9-0012-3C27-4928-4741304EF46A}"/>
+              </a:ext>
+            </a:extLst>
+          </p:cNvPr>
+          <p:cNvSpPr/>
+          <p:nvPr/>
+        </p:nvSpPr>
+        <p:spPr>
+          <a:xfrm>
+            <a:off x="4374878" y="1024824"/>
+            <a:ext cx="1509654" cy="488950"/>
+          </a:xfrm>
+          <a:prstGeom prst="roundRect">
+            <a:avLst/>
+          </a:prstGeom>
+        </p:spPr>
+        <p:style>
+          <a:lnRef idx="2">
+            <a:schemeClr val="accent1">
+              <a:shade val="15000"/>
+            </a:schemeClr>
+          </a:lnRef>
+          <a:fillRef idx="1">
+            <a:schemeClr val="accent1"/>
+          </a:fillRef>
+          <a:effectRef idx="0">
+            <a:schemeClr val="accent1"/>
+          </a:effectRef>
+          <a:fontRef idx="minor">
+            <a:schemeClr val="lt1"/>
+          </a:fontRef>
+        </p:style>
+        <p:txBody>
+          <a:bodyPr rtlCol="0" anchor="ctr"/>
+          <a:lstStyle/>
+          <a:p>
+            <a:pPr algn="ctr"/>
+            <a:r>
+              <a:rPr lang="en-US" altLang="zh-CN" sz="1200" dirty="0" err="1"/>
+              <a:t>ImageProcessor</a:t>
+            </a:r>
+            <a:endParaRPr lang="zh-CN" altLang="en-US" sz="1200" dirty="0"/>
+          </a:p>
+        </p:txBody>
+      </p:sp>
+      <p:sp>
+        <p:nvSpPr>
+          <p:cNvPr id="10" name="矩形 37">
+            <a:extLst>
+              <a:ext uri="{FF2B5EF4-FFF2-40B4-BE49-F238E27FC236}">
+                <a16:creationId xmlns:a16="http://schemas.microsoft.com/office/drawing/2014/main" id="{A71E58FC-899C-06F2-B4EA-0643F5724844}"/>
+              </a:ext>
+            </a:extLst>
+          </p:cNvPr>
+          <p:cNvSpPr/>
+          <p:nvPr/>
+        </p:nvSpPr>
+        <p:spPr>
+          <a:xfrm>
+            <a:off x="4374878" y="1625695"/>
+            <a:ext cx="1509654" cy="1297467"/>
+          </a:xfrm>
+          <a:prstGeom prst="rect">
+            <a:avLst/>
+          </a:prstGeom>
+        </p:spPr>
+        <p:style>
+          <a:lnRef idx="1">
+            <a:schemeClr val="accent1"/>
+          </a:lnRef>
+          <a:fillRef idx="2">
+            <a:schemeClr val="accent1"/>
+          </a:fillRef>
+          <a:effectRef idx="1">
+            <a:schemeClr val="accent1"/>
+          </a:effectRef>
+          <a:fontRef idx="minor">
+            <a:schemeClr val="dk1"/>
+          </a:fontRef>
+        </p:style>
+        <p:txBody>
+          <a:bodyPr rtlCol="0" anchor="ctr"/>
+          <a:lstStyle/>
+          <a:p>
+            <a:pPr marL="171450" indent="-171450">
+              <a:buFont typeface="Arial" panose="020B0604020202020204" pitchFamily="34" charset="0"/>
+              <a:buChar char="•"/>
+            </a:pPr>
+            <a:r>
+              <a:rPr lang="en-US" altLang="zh-CN" sz="1000" b="1" dirty="0"/>
+              <a:t>Methods</a:t>
+            </a:r>
+            <a:r>
+              <a:rPr lang="en-US" altLang="zh-CN" sz="1000" dirty="0"/>
+              <a:t>:</a:t>
+            </a:r>
+          </a:p>
+          <a:p>
+            <a:r>
+              <a:rPr lang="en-US" altLang="zh-CN" sz="1000" dirty="0"/>
+              <a:t>`</a:t>
+            </a:r>
+            <a:r>
+              <a:rPr lang="en-US" altLang="zh-CN" sz="1000" dirty="0" err="1"/>
+              <a:t>resize_image</a:t>
+            </a:r>
+            <a:r>
+              <a:rPr lang="en-US" altLang="zh-CN" sz="1000" dirty="0"/>
+              <a:t>()`, `</a:t>
+            </a:r>
+            <a:r>
+              <a:rPr lang="en-US" altLang="zh-CN" sz="1000" dirty="0" err="1"/>
+              <a:t>normalize_image</a:t>
+            </a:r>
+            <a:r>
+              <a:rPr lang="en-US" altLang="zh-CN" sz="1000" dirty="0"/>
+              <a:t>()`, `</a:t>
+            </a:r>
+            <a:r>
+              <a:rPr lang="en-US" altLang="zh-CN" sz="1000" dirty="0" err="1"/>
+              <a:t>preprocess_image</a:t>
+            </a:r>
+            <a:r>
+              <a:rPr lang="en-US" altLang="zh-CN" sz="1000" dirty="0"/>
+              <a:t>()`</a:t>
+            </a:r>
+            <a:endParaRPr lang="zh-CN" altLang="en-US" sz="1000" dirty="0"/>
+          </a:p>
+        </p:txBody>
+      </p:sp>
+      <p:sp>
+        <p:nvSpPr>
+          <p:cNvPr id="11" name="矩形: 圆角 4">
+            <a:extLst>
+              <a:ext uri="{FF2B5EF4-FFF2-40B4-BE49-F238E27FC236}">
+                <a16:creationId xmlns:a16="http://schemas.microsoft.com/office/drawing/2014/main" id="{C1D4D847-E544-65FD-3F69-023AB1D3ED8E}"/>
+              </a:ext>
+            </a:extLst>
+          </p:cNvPr>
+          <p:cNvSpPr/>
+          <p:nvPr/>
+        </p:nvSpPr>
+        <p:spPr>
+          <a:xfrm>
+            <a:off x="6326848" y="1024824"/>
+            <a:ext cx="1509654" cy="488950"/>
+          </a:xfrm>
+          <a:prstGeom prst="roundRect">
+            <a:avLst/>
+          </a:prstGeom>
+        </p:spPr>
+        <p:style>
+          <a:lnRef idx="2">
+            <a:schemeClr val="accent1">
+              <a:shade val="15000"/>
+            </a:schemeClr>
+          </a:lnRef>
+          <a:fillRef idx="1">
+            <a:schemeClr val="accent1"/>
+          </a:fillRef>
+          <a:effectRef idx="0">
+            <a:schemeClr val="accent1"/>
+          </a:effectRef>
+          <a:fontRef idx="minor">
+            <a:schemeClr val="lt1"/>
+          </a:fontRef>
+        </p:style>
+        <p:txBody>
+          <a:bodyPr rtlCol="0" anchor="ctr"/>
+          <a:lstStyle/>
+          <a:p>
+            <a:pPr algn="ctr"/>
+            <a:r>
+              <a:rPr lang="en-US" altLang="zh-CN" sz="1200" dirty="0" err="1"/>
+              <a:t>FileHandler</a:t>
+            </a:r>
+            <a:endParaRPr lang="zh-CN" altLang="en-US" sz="1200" dirty="0"/>
+          </a:p>
+        </p:txBody>
+      </p:sp>
+      <p:sp>
+        <p:nvSpPr>
+          <p:cNvPr id="12" name="矩形 37">
+            <a:extLst>
+              <a:ext uri="{FF2B5EF4-FFF2-40B4-BE49-F238E27FC236}">
+                <a16:creationId xmlns:a16="http://schemas.microsoft.com/office/drawing/2014/main" id="{DC01656C-7085-BDEA-F545-88F8B88D8A46}"/>
+              </a:ext>
+            </a:extLst>
+          </p:cNvPr>
+          <p:cNvSpPr/>
+          <p:nvPr/>
+        </p:nvSpPr>
+        <p:spPr>
+          <a:xfrm>
+            <a:off x="6326848" y="1625695"/>
+            <a:ext cx="1509654" cy="1297467"/>
+          </a:xfrm>
+          <a:prstGeom prst="rect">
+            <a:avLst/>
+          </a:prstGeom>
+        </p:spPr>
+        <p:style>
+          <a:lnRef idx="1">
+            <a:schemeClr val="accent1"/>
+          </a:lnRef>
+          <a:fillRef idx="2">
+            <a:schemeClr val="accent1"/>
+          </a:fillRef>
+          <a:effectRef idx="1">
+            <a:schemeClr val="accent1"/>
+          </a:effectRef>
+          <a:fontRef idx="minor">
+            <a:schemeClr val="dk1"/>
+          </a:fontRef>
+        </p:style>
+        <p:txBody>
+          <a:bodyPr rtlCol="0" anchor="ctr"/>
+          <a:lstStyle/>
+          <a:p>
+            <a:pPr marL="171450" indent="-171450">
+              <a:buFont typeface="Arial" panose="020B0604020202020204" pitchFamily="34" charset="0"/>
+              <a:buChar char="•"/>
+            </a:pPr>
+            <a:r>
+              <a:rPr lang="en-US" altLang="zh-CN" sz="1000" b="1" dirty="0"/>
+              <a:t>Methods</a:t>
+            </a:r>
+            <a:r>
+              <a:rPr lang="en-US" altLang="zh-CN" sz="1000" dirty="0"/>
+              <a:t>:</a:t>
+            </a:r>
+          </a:p>
+          <a:p>
+            <a:r>
+              <a:rPr lang="nn-NO" altLang="zh-CN" sz="1000" dirty="0"/>
+              <a:t>`upload_file()`, `validate_file()`, `store_file()`</a:t>
+            </a:r>
+            <a:endParaRPr lang="zh-CN" altLang="en-US" sz="1000" dirty="0"/>
+          </a:p>
+        </p:txBody>
+      </p:sp>
+      <p:sp>
+        <p:nvSpPr>
+          <p:cNvPr id="13" name="矩形: 圆角 4">
+            <a:extLst>
+              <a:ext uri="{FF2B5EF4-FFF2-40B4-BE49-F238E27FC236}">
+                <a16:creationId xmlns:a16="http://schemas.microsoft.com/office/drawing/2014/main" id="{66A1D963-4E93-7FEC-A888-086A1248F2F2}"/>
+              </a:ext>
+            </a:extLst>
+          </p:cNvPr>
+          <p:cNvSpPr/>
+          <p:nvPr/>
+        </p:nvSpPr>
+        <p:spPr>
+          <a:xfrm>
+            <a:off x="470938" y="3278529"/>
+            <a:ext cx="1509654" cy="488950"/>
+          </a:xfrm>
+          <a:prstGeom prst="roundRect">
+            <a:avLst/>
+          </a:prstGeom>
+        </p:spPr>
+        <p:style>
+          <a:lnRef idx="2">
+            <a:schemeClr val="accent1">
+              <a:shade val="15000"/>
+            </a:schemeClr>
+          </a:lnRef>
+          <a:fillRef idx="1">
+            <a:schemeClr val="accent1"/>
+          </a:fillRef>
+          <a:effectRef idx="0">
+            <a:schemeClr val="accent1"/>
+          </a:effectRef>
+          <a:fontRef idx="minor">
+            <a:schemeClr val="lt1"/>
+          </a:fontRef>
+        </p:style>
+        <p:txBody>
+          <a:bodyPr rtlCol="0" anchor="ctr"/>
+          <a:lstStyle/>
+          <a:p>
+            <a:pPr algn="ctr"/>
+            <a:r>
+              <a:rPr lang="en-US" altLang="zh-CN" sz="1200" dirty="0"/>
+              <a:t>Classifier</a:t>
+            </a:r>
+            <a:endParaRPr lang="zh-CN" altLang="en-US" sz="1200" dirty="0"/>
+          </a:p>
+        </p:txBody>
+      </p:sp>
+      <p:sp>
+        <p:nvSpPr>
+          <p:cNvPr id="14" name="矩形 37">
+            <a:extLst>
+              <a:ext uri="{FF2B5EF4-FFF2-40B4-BE49-F238E27FC236}">
+                <a16:creationId xmlns:a16="http://schemas.microsoft.com/office/drawing/2014/main" id="{7586592F-D30D-1780-94EC-2EF5BD7E854C}"/>
+              </a:ext>
+            </a:extLst>
+          </p:cNvPr>
+          <p:cNvSpPr/>
+          <p:nvPr/>
+        </p:nvSpPr>
+        <p:spPr>
+          <a:xfrm>
+            <a:off x="470938" y="3879400"/>
+            <a:ext cx="1509654" cy="1297467"/>
+          </a:xfrm>
+          <a:prstGeom prst="rect">
+            <a:avLst/>
+          </a:prstGeom>
+        </p:spPr>
+        <p:style>
+          <a:lnRef idx="1">
+            <a:schemeClr val="accent1"/>
+          </a:lnRef>
+          <a:fillRef idx="2">
+            <a:schemeClr val="accent1"/>
+          </a:fillRef>
+          <a:effectRef idx="1">
+            <a:schemeClr val="accent1"/>
+          </a:effectRef>
+          <a:fontRef idx="minor">
+            <a:schemeClr val="dk1"/>
+          </a:fontRef>
+        </p:style>
+        <p:txBody>
+          <a:bodyPr rtlCol="0" anchor="ctr"/>
+          <a:lstStyle/>
+          <a:p>
+            <a:pPr marL="171450" indent="-171450">
+              <a:buFont typeface="Arial" panose="020B0604020202020204" pitchFamily="34" charset="0"/>
+              <a:buChar char="•"/>
+            </a:pPr>
+            <a:r>
+              <a:rPr lang="en-US" altLang="zh-CN" sz="1000" b="1" dirty="0"/>
+              <a:t>Methods</a:t>
+            </a:r>
+            <a:r>
+              <a:rPr lang="en-US" altLang="zh-CN" sz="1000" dirty="0"/>
+              <a:t>:</a:t>
+            </a:r>
+          </a:p>
+          <a:p>
+            <a:r>
+              <a:rPr lang="nn-NO" altLang="zh-CN" sz="1000" dirty="0"/>
+              <a:t>`load_model()`, `predict()`, `generate_placeholder_prediction()`</a:t>
+            </a:r>
+            <a:endParaRPr lang="zh-CN" altLang="en-US" sz="1000" dirty="0"/>
+          </a:p>
+        </p:txBody>
+      </p:sp>
+      <p:sp>
+        <p:nvSpPr>
+          <p:cNvPr id="15" name="矩形: 圆角 4">
+            <a:extLst>
+              <a:ext uri="{FF2B5EF4-FFF2-40B4-BE49-F238E27FC236}">
+                <a16:creationId xmlns:a16="http://schemas.microsoft.com/office/drawing/2014/main" id="{ADCDBE6A-9911-10BF-941E-16DF5C27EE54}"/>
+              </a:ext>
+            </a:extLst>
+          </p:cNvPr>
+          <p:cNvSpPr/>
+          <p:nvPr/>
+        </p:nvSpPr>
+        <p:spPr>
+          <a:xfrm>
+            <a:off x="2422908" y="3278529"/>
+            <a:ext cx="1509654" cy="488950"/>
+          </a:xfrm>
+          <a:prstGeom prst="roundRect">
+            <a:avLst/>
+          </a:prstGeom>
+        </p:spPr>
+        <p:style>
+          <a:lnRef idx="2">
+            <a:schemeClr val="accent1">
+              <a:shade val="15000"/>
+            </a:schemeClr>
+          </a:lnRef>
+          <a:fillRef idx="1">
+            <a:schemeClr val="accent1"/>
+          </a:fillRef>
+          <a:effectRef idx="0">
+            <a:schemeClr val="accent1"/>
+          </a:effectRef>
+          <a:fontRef idx="minor">
+            <a:schemeClr val="lt1"/>
+          </a:fontRef>
+        </p:style>
+        <p:txBody>
+          <a:bodyPr rtlCol="0" anchor="ctr"/>
+          <a:lstStyle/>
+          <a:p>
+            <a:pPr algn="ctr"/>
+            <a:r>
+              <a:rPr lang="en-US" altLang="zh-CN" sz="1200" dirty="0" err="1"/>
+              <a:t>FrontendAPI</a:t>
+            </a:r>
+            <a:endParaRPr lang="zh-CN" altLang="en-US" sz="1200" dirty="0"/>
+          </a:p>
+        </p:txBody>
+      </p:sp>
+      <p:sp>
+        <p:nvSpPr>
+          <p:cNvPr id="16" name="矩形 37">
+            <a:extLst>
+              <a:ext uri="{FF2B5EF4-FFF2-40B4-BE49-F238E27FC236}">
+                <a16:creationId xmlns:a16="http://schemas.microsoft.com/office/drawing/2014/main" id="{8741F35B-6D68-C921-C7D4-CFBE092588B3}"/>
+              </a:ext>
+            </a:extLst>
+          </p:cNvPr>
+          <p:cNvSpPr/>
+          <p:nvPr/>
+        </p:nvSpPr>
+        <p:spPr>
+          <a:xfrm>
+            <a:off x="2422908" y="3879400"/>
+            <a:ext cx="1509654" cy="1297467"/>
+          </a:xfrm>
+          <a:prstGeom prst="rect">
+            <a:avLst/>
+          </a:prstGeom>
+        </p:spPr>
+        <p:style>
+          <a:lnRef idx="1">
+            <a:schemeClr val="accent1"/>
+          </a:lnRef>
+          <a:fillRef idx="2">
+            <a:schemeClr val="accent1"/>
+          </a:fillRef>
+          <a:effectRef idx="1">
+            <a:schemeClr val="accent1"/>
+          </a:effectRef>
+          <a:fontRef idx="minor">
+            <a:schemeClr val="dk1"/>
+          </a:fontRef>
+        </p:style>
+        <p:txBody>
+          <a:bodyPr rtlCol="0" anchor="ctr"/>
+          <a:lstStyle/>
+          <a:p>
+            <a:pPr marL="171450" indent="-171450">
+              <a:buFont typeface="Arial" panose="020B0604020202020204" pitchFamily="34" charset="0"/>
+              <a:buChar char="•"/>
+            </a:pPr>
+            <a:r>
+              <a:rPr lang="en-US" altLang="zh-CN" sz="1000" b="1" dirty="0"/>
+              <a:t>Methods</a:t>
+            </a:r>
+            <a:r>
+              <a:rPr lang="en-US" altLang="zh-CN" sz="1000" dirty="0"/>
+              <a:t>:</a:t>
+            </a:r>
+          </a:p>
+          <a:p>
+            <a:r>
+              <a:rPr lang="en-US" altLang="zh-CN" sz="1000" dirty="0"/>
+              <a:t>`</a:t>
+            </a:r>
+            <a:r>
+              <a:rPr lang="en-US" altLang="zh-CN" sz="1000" dirty="0" err="1"/>
+              <a:t>handle_file_upload</a:t>
+            </a:r>
+            <a:r>
+              <a:rPr lang="en-US" altLang="zh-CN" sz="1000" dirty="0"/>
+              <a:t>()`, `</a:t>
+            </a:r>
+            <a:r>
+              <a:rPr lang="en-US" altLang="zh-CN" sz="1000" dirty="0" err="1"/>
+              <a:t>send_prediction_response</a:t>
+            </a:r>
+            <a:r>
+              <a:rPr lang="en-US" altLang="zh-CN" sz="1000" dirty="0"/>
+              <a:t>()`</a:t>
+            </a:r>
+            <a:endParaRPr lang="zh-CN" altLang="en-US" sz="1000" dirty="0"/>
+          </a:p>
+        </p:txBody>
+      </p:sp>
+      <p:sp>
+        <p:nvSpPr>
+          <p:cNvPr id="17" name="矩形: 圆角 4">
+            <a:extLst>
+              <a:ext uri="{FF2B5EF4-FFF2-40B4-BE49-F238E27FC236}">
+                <a16:creationId xmlns:a16="http://schemas.microsoft.com/office/drawing/2014/main" id="{52AA12D7-EA27-9DDA-5E7C-B3A727B0A917}"/>
+              </a:ext>
+            </a:extLst>
+          </p:cNvPr>
+          <p:cNvSpPr/>
+          <p:nvPr/>
+        </p:nvSpPr>
+        <p:spPr>
+          <a:xfrm>
+            <a:off x="4374878" y="3278529"/>
+            <a:ext cx="1509654" cy="488950"/>
+          </a:xfrm>
+          <a:prstGeom prst="roundRect">
+            <a:avLst/>
+          </a:prstGeom>
+        </p:spPr>
+        <p:style>
+          <a:lnRef idx="2">
+            <a:schemeClr val="accent1">
+              <a:shade val="15000"/>
+            </a:schemeClr>
+          </a:lnRef>
+          <a:fillRef idx="1">
+            <a:schemeClr val="accent1"/>
+          </a:fillRef>
+          <a:effectRef idx="0">
+            <a:schemeClr val="accent1"/>
+          </a:effectRef>
+          <a:fontRef idx="minor">
+            <a:schemeClr val="lt1"/>
+          </a:fontRef>
+        </p:style>
+        <p:txBody>
+          <a:bodyPr rtlCol="0" anchor="ctr"/>
+          <a:lstStyle/>
+          <a:p>
+            <a:pPr algn="ctr"/>
+            <a:r>
+              <a:rPr lang="en-US" altLang="zh-CN" sz="1200" dirty="0" err="1"/>
+              <a:t>HistoryManager</a:t>
+            </a:r>
+            <a:endParaRPr lang="zh-CN" altLang="en-US" sz="1200" dirty="0"/>
+          </a:p>
+        </p:txBody>
+      </p:sp>
+      <p:sp>
+        <p:nvSpPr>
+          <p:cNvPr id="18" name="矩形 37">
+            <a:extLst>
+              <a:ext uri="{FF2B5EF4-FFF2-40B4-BE49-F238E27FC236}">
+                <a16:creationId xmlns:a16="http://schemas.microsoft.com/office/drawing/2014/main" id="{84AE5776-3305-01AD-D507-78C06A1779D8}"/>
+              </a:ext>
+            </a:extLst>
+          </p:cNvPr>
+          <p:cNvSpPr/>
+          <p:nvPr/>
+        </p:nvSpPr>
+        <p:spPr>
+          <a:xfrm>
+            <a:off x="4374878" y="3879400"/>
+            <a:ext cx="1509654" cy="1297467"/>
+          </a:xfrm>
+          <a:prstGeom prst="rect">
+            <a:avLst/>
+          </a:prstGeom>
+        </p:spPr>
+        <p:style>
+          <a:lnRef idx="1">
+            <a:schemeClr val="accent1"/>
+          </a:lnRef>
+          <a:fillRef idx="2">
+            <a:schemeClr val="accent1"/>
+          </a:fillRef>
+          <a:effectRef idx="1">
+            <a:schemeClr val="accent1"/>
+          </a:effectRef>
+          <a:fontRef idx="minor">
+            <a:schemeClr val="dk1"/>
+          </a:fontRef>
+        </p:style>
+        <p:txBody>
+          <a:bodyPr rtlCol="0" anchor="ctr"/>
+          <a:lstStyle/>
+          <a:p>
+            <a:pPr marL="171450" indent="-171450">
+              <a:buFont typeface="Arial" panose="020B0604020202020204" pitchFamily="34" charset="0"/>
+              <a:buChar char="•"/>
+            </a:pPr>
+            <a:r>
+              <a:rPr lang="en-US" altLang="zh-CN" sz="1000" b="1" dirty="0"/>
+              <a:t>Methods</a:t>
+            </a:r>
+            <a:r>
+              <a:rPr lang="en-US" altLang="zh-CN" sz="1000" dirty="0"/>
+              <a:t>:</a:t>
+            </a:r>
+          </a:p>
+          <a:p>
+            <a:r>
+              <a:rPr lang="en-US" altLang="zh-CN" sz="1000" dirty="0"/>
+              <a:t>`</a:t>
+            </a:r>
+            <a:r>
+              <a:rPr lang="en-US" altLang="zh-CN" sz="1000" dirty="0" err="1"/>
+              <a:t>fetch_user_history</a:t>
+            </a:r>
+            <a:r>
+              <a:rPr lang="en-US" altLang="zh-CN" sz="1000" dirty="0"/>
+              <a:t>()`, `</a:t>
+            </a:r>
+            <a:r>
+              <a:rPr lang="en-US" altLang="zh-CN" sz="1000" dirty="0" err="1"/>
+              <a:t>store_classification_result</a:t>
+            </a:r>
+            <a:r>
+              <a:rPr lang="en-US" altLang="zh-CN" sz="1000" dirty="0"/>
+              <a:t>()`</a:t>
+            </a:r>
+            <a:endParaRPr lang="zh-CN" altLang="en-US" sz="1000" dirty="0"/>
+          </a:p>
+        </p:txBody>
+      </p:sp>
+      <p:sp>
+        <p:nvSpPr>
+          <p:cNvPr id="19" name="矩形: 圆角 4">
+            <a:extLst>
+              <a:ext uri="{FF2B5EF4-FFF2-40B4-BE49-F238E27FC236}">
+                <a16:creationId xmlns:a16="http://schemas.microsoft.com/office/drawing/2014/main" id="{BCF00E7C-6F42-F8D2-D430-0E7E29E39042}"/>
+              </a:ext>
+            </a:extLst>
+          </p:cNvPr>
+          <p:cNvSpPr/>
+          <p:nvPr/>
+        </p:nvSpPr>
+        <p:spPr>
+          <a:xfrm>
+            <a:off x="6326848" y="3278529"/>
+            <a:ext cx="1509654" cy="488950"/>
+          </a:xfrm>
+          <a:prstGeom prst="roundRect">
+            <a:avLst/>
+          </a:prstGeom>
+        </p:spPr>
+        <p:style>
+          <a:lnRef idx="2">
+            <a:schemeClr val="accent1">
+              <a:shade val="15000"/>
+            </a:schemeClr>
+          </a:lnRef>
+          <a:fillRef idx="1">
+            <a:schemeClr val="accent1"/>
+          </a:fillRef>
+          <a:effectRef idx="0">
+            <a:schemeClr val="accent1"/>
+          </a:effectRef>
+          <a:fontRef idx="minor">
+            <a:schemeClr val="lt1"/>
+          </a:fontRef>
+        </p:style>
+        <p:txBody>
+          <a:bodyPr rtlCol="0" anchor="ctr"/>
+          <a:lstStyle/>
+          <a:p>
+            <a:pPr algn="ctr"/>
+            <a:r>
+              <a:rPr lang="en-US" altLang="zh-CN" sz="1200" dirty="0"/>
+              <a:t>Tester</a:t>
+            </a:r>
+            <a:endParaRPr lang="zh-CN" altLang="en-US" sz="1200" dirty="0"/>
+          </a:p>
+        </p:txBody>
+      </p:sp>
+      <p:sp>
+        <p:nvSpPr>
+          <p:cNvPr id="20" name="矩形 37">
+            <a:extLst>
+              <a:ext uri="{FF2B5EF4-FFF2-40B4-BE49-F238E27FC236}">
+                <a16:creationId xmlns:a16="http://schemas.microsoft.com/office/drawing/2014/main" id="{E04D9A99-691A-FF8E-A66D-7AE7987A8FFD}"/>
+              </a:ext>
+            </a:extLst>
+          </p:cNvPr>
+          <p:cNvSpPr/>
+          <p:nvPr/>
+        </p:nvSpPr>
+        <p:spPr>
+          <a:xfrm>
+            <a:off x="6326848" y="3879400"/>
+            <a:ext cx="1509654" cy="1297467"/>
+          </a:xfrm>
+          <a:prstGeom prst="rect">
+            <a:avLst/>
+          </a:prstGeom>
+        </p:spPr>
+        <p:style>
+          <a:lnRef idx="1">
+            <a:schemeClr val="accent1"/>
+          </a:lnRef>
+          <a:fillRef idx="2">
+            <a:schemeClr val="accent1"/>
+          </a:fillRef>
+          <a:effectRef idx="1">
+            <a:schemeClr val="accent1"/>
+          </a:effectRef>
+          <a:fontRef idx="minor">
+            <a:schemeClr val="dk1"/>
+          </a:fontRef>
+        </p:style>
+        <p:txBody>
+          <a:bodyPr rtlCol="0" anchor="ctr"/>
+          <a:lstStyle/>
+          <a:p>
+            <a:pPr marL="171450" indent="-171450">
+              <a:buFont typeface="Arial" panose="020B0604020202020204" pitchFamily="34" charset="0"/>
+              <a:buChar char="•"/>
+            </a:pPr>
+            <a:r>
+              <a:rPr lang="en-US" altLang="zh-CN" sz="1000" b="1" dirty="0"/>
+              <a:t>Methods</a:t>
+            </a:r>
+            <a:r>
+              <a:rPr lang="en-US" altLang="zh-CN" sz="1000" dirty="0"/>
+              <a:t>:</a:t>
+            </a:r>
+          </a:p>
+          <a:p>
+            <a:r>
+              <a:rPr lang="en-US" altLang="zh-CN" sz="1000" dirty="0"/>
+              <a:t>`</a:t>
+            </a:r>
+            <a:r>
+              <a:rPr lang="en-US" altLang="zh-CN" sz="1000" dirty="0" err="1"/>
+              <a:t>run_end_to_end_test</a:t>
+            </a:r>
+            <a:r>
+              <a:rPr lang="en-US" altLang="zh-CN" sz="1000" dirty="0"/>
+              <a:t>()`, `</a:t>
+            </a:r>
+            <a:r>
+              <a:rPr lang="en-US" altLang="zh-CN" sz="1000" dirty="0" err="1"/>
+              <a:t>collect_feedback</a:t>
+            </a:r>
+            <a:r>
+              <a:rPr lang="en-US" altLang="zh-CN" sz="1000" dirty="0"/>
+              <a:t>()`</a:t>
+            </a:r>
+            <a:endParaRPr lang="zh-CN" altLang="en-US" sz="1000" dirty="0"/>
+          </a:p>
+        </p:txBody>
+      </p:sp>
+      <p:sp>
+        <p:nvSpPr>
+          <p:cNvPr id="24" name="TextBox 23">
+            <a:extLst>
+              <a:ext uri="{FF2B5EF4-FFF2-40B4-BE49-F238E27FC236}">
+                <a16:creationId xmlns:a16="http://schemas.microsoft.com/office/drawing/2014/main" id="{E69FC745-9648-B7C9-0A54-30A7B682CC68}"/>
+              </a:ext>
+            </a:extLst>
+          </p:cNvPr>
+          <p:cNvSpPr txBox="1"/>
+          <p:nvPr/>
+        </p:nvSpPr>
+        <p:spPr>
+          <a:xfrm>
+            <a:off x="8278818" y="446090"/>
+            <a:ext cx="3591710" cy="4524315"/>
+          </a:xfrm>
+          <a:prstGeom prst="rect">
+            <a:avLst/>
+          </a:prstGeom>
+          <a:noFill/>
+        </p:spPr>
+        <p:txBody>
+          <a:bodyPr wrap="square">
+            <a:spAutoFit/>
+          </a:bodyPr>
+          <a:lstStyle/>
+          <a:p>
+            <a:pPr marL="285750" indent="-285750">
+              <a:buFont typeface="Arial" panose="020B0604020202020204" pitchFamily="34" charset="0"/>
+              <a:buChar char="•"/>
+            </a:pPr>
+            <a:r>
+              <a:rPr lang="zh-CN" altLang="en-US" sz="1600" b="1" dirty="0"/>
+              <a:t>ProjectConfig</a:t>
+            </a:r>
+            <a:r>
+              <a:rPr lang="zh-CN" altLang="en-US" sz="1600" dirty="0"/>
+              <a:t> depends on </a:t>
+            </a:r>
+            <a:r>
+              <a:rPr lang="zh-CN" altLang="en-US" sz="1600" b="1" dirty="0"/>
+              <a:t>DatabaseManager</a:t>
+            </a:r>
+            <a:r>
+              <a:rPr lang="zh-CN" altLang="en-US" sz="1600" dirty="0"/>
+              <a:t> to load and configure the database path.  </a:t>
+            </a:r>
+          </a:p>
+          <a:p>
+            <a:pPr marL="285750" indent="-285750">
+              <a:buFont typeface="Arial" panose="020B0604020202020204" pitchFamily="34" charset="0"/>
+              <a:buChar char="•"/>
+            </a:pPr>
+            <a:r>
+              <a:rPr lang="zh-CN" altLang="en-US" sz="1600" b="1" dirty="0"/>
+              <a:t>FileHandler</a:t>
+            </a:r>
+            <a:r>
+              <a:rPr lang="zh-CN" altLang="en-US" sz="1600" dirty="0"/>
+              <a:t> collaborates with </a:t>
+            </a:r>
+            <a:r>
+              <a:rPr lang="zh-CN" altLang="en-US" sz="1600" b="1" dirty="0"/>
+              <a:t>ImageProcessor</a:t>
+            </a:r>
+            <a:r>
+              <a:rPr lang="zh-CN" altLang="en-US" sz="1600" dirty="0"/>
+              <a:t> to preprocess uploaded files and pass them to </a:t>
+            </a:r>
+            <a:r>
+              <a:rPr lang="zh-CN" altLang="en-US" sz="1600" b="1" dirty="0"/>
+              <a:t>Classifier</a:t>
+            </a:r>
+            <a:r>
+              <a:rPr lang="zh-CN" altLang="en-US" sz="1600" dirty="0"/>
+              <a:t>.  </a:t>
+            </a:r>
+          </a:p>
+          <a:p>
+            <a:pPr marL="285750" indent="-285750">
+              <a:buFont typeface="Arial" panose="020B0604020202020204" pitchFamily="34" charset="0"/>
+              <a:buChar char="•"/>
+            </a:pPr>
+            <a:r>
+              <a:rPr lang="zh-CN" altLang="en-US" sz="1600" b="1" dirty="0"/>
+              <a:t>Classifier</a:t>
+            </a:r>
+            <a:r>
+              <a:rPr lang="zh-CN" altLang="en-US" sz="1600" dirty="0"/>
+              <a:t> works with </a:t>
+            </a:r>
+            <a:r>
+              <a:rPr lang="zh-CN" altLang="en-US" sz="1600" b="1" dirty="0"/>
+              <a:t>DatabaseManager</a:t>
+            </a:r>
+            <a:r>
+              <a:rPr lang="zh-CN" altLang="en-US" sz="1600" dirty="0"/>
+              <a:t> to store classification results in the database and uses </a:t>
+            </a:r>
+            <a:r>
+              <a:rPr lang="zh-CN" altLang="en-US" sz="1600" b="1" dirty="0"/>
+              <a:t>HistoryManager</a:t>
+            </a:r>
+            <a:r>
+              <a:rPr lang="zh-CN" altLang="en-US" sz="1600" dirty="0"/>
+              <a:t> to allow users to query their history.  </a:t>
+            </a:r>
+          </a:p>
+          <a:p>
+            <a:pPr marL="285750" indent="-285750">
+              <a:buFont typeface="Arial" panose="020B0604020202020204" pitchFamily="34" charset="0"/>
+              <a:buChar char="•"/>
+            </a:pPr>
+            <a:r>
+              <a:rPr lang="zh-CN" altLang="en-US" sz="1600" b="1" dirty="0"/>
+              <a:t>FrontendAPI</a:t>
+            </a:r>
+            <a:r>
+              <a:rPr lang="zh-CN" altLang="en-US" sz="1600" dirty="0"/>
+              <a:t> interacts with </a:t>
+            </a:r>
+            <a:r>
+              <a:rPr lang="zh-CN" altLang="en-US" sz="1600" b="1" dirty="0"/>
+              <a:t>FileHandler</a:t>
+            </a:r>
+            <a:r>
+              <a:rPr lang="zh-CN" altLang="en-US" sz="1600" dirty="0"/>
+              <a:t> and </a:t>
+            </a:r>
+            <a:r>
+              <a:rPr lang="zh-CN" altLang="en-US" sz="1600" b="1" dirty="0"/>
+              <a:t>Classifier</a:t>
+            </a:r>
+            <a:r>
+              <a:rPr lang="zh-CN" altLang="en-US" sz="1600" dirty="0"/>
+              <a:t> to facilitate user interface communication.  </a:t>
+            </a:r>
+          </a:p>
+          <a:p>
+            <a:pPr marL="285750" indent="-285750">
+              <a:buFont typeface="Arial" panose="020B0604020202020204" pitchFamily="34" charset="0"/>
+              <a:buChar char="•"/>
+            </a:pPr>
+            <a:r>
+              <a:rPr lang="zh-CN" altLang="en-US" sz="1600" b="1" dirty="0"/>
+              <a:t>Tester </a:t>
+            </a:r>
+            <a:r>
+              <a:rPr lang="zh-CN" altLang="en-US" sz="1600" dirty="0"/>
+              <a:t>connects all modules for end-to-end testing.</a:t>
+            </a:r>
+          </a:p>
+        </p:txBody>
+      </p:sp>
+    </p:spTree>
+    <p:extLst>
+      <p:ext uri="{BB962C8B-B14F-4D97-AF65-F5344CB8AC3E}">
+        <p14:creationId xmlns:p14="http://schemas.microsoft.com/office/powerpoint/2010/main" val="4131985971"/>
       </p:ext>
     </p:extLst>
   </p:cSld>

</xml_diff>